<commit_message>
Thesis proposal presentation checkpoint
</commit_message>
<xml_diff>
--- a/documentation/Thesis_presentation_Sebastian_Russo.pptx
+++ b/documentation/Thesis_presentation_Sebastian_Russo.pptx
@@ -6534,7 +6534,13 @@
       </p:grpSpPr>
       <p:pic>
         <p:nvPicPr>
-          <p:cNvPr id="2" name="Bildplatzhalter 6"/>
+          <p:cNvPr id="5" name="Picture 4">
+            <a:extLst>
+              <a:ext uri="{FF2B5EF4-FFF2-40B4-BE49-F238E27FC236}">
+                <a16:creationId xmlns:a16="http://schemas.microsoft.com/office/drawing/2014/main" id="{5C33E7FC-A765-788A-ECD6-F14EB9087942}"/>
+              </a:ext>
+            </a:extLst>
+          </p:cNvPr>
           <p:cNvPicPr>
             <a:picLocks noChangeAspect="1"/>
           </p:cNvPicPr>
@@ -6548,16 +6554,12 @@
         </p:blipFill>
         <p:spPr>
           <a:xfrm>
-            <a:off x="-63724" y="0"/>
-            <a:ext cx="12254395" cy="7115403"/>
+            <a:off x="0" y="0"/>
+            <a:ext cx="12192000" cy="6858000"/>
           </a:xfrm>
           <a:prstGeom prst="rect">
             <a:avLst/>
           </a:prstGeom>
-          <a:noFill/>
-          <a:ln cap="flat">
-            <a:noFill/>
-          </a:ln>
         </p:spPr>
       </p:pic>
       <p:sp>
@@ -6568,15 +6570,36 @@
         </p:nvSpPr>
         <p:spPr>
           <a:xfrm>
-            <a:off x="190328" y="810228"/>
-            <a:ext cx="11811344" cy="5128690"/>
+            <a:off x="190328" y="426720"/>
+            <a:ext cx="11811344" cy="5679440"/>
           </a:xfrm>
           <a:prstGeom prst="rect">
             <a:avLst/>
           </a:prstGeom>
-          <a:solidFill>
-            <a:srgbClr val="F9423A"/>
-          </a:solidFill>
+          <a:gradFill flip="none" rotWithShape="1">
+            <a:gsLst>
+              <a:gs pos="0">
+                <a:srgbClr val="F9423A">
+                  <a:shade val="30000"/>
+                  <a:satMod val="115000"/>
+                </a:srgbClr>
+              </a:gs>
+              <a:gs pos="50000">
+                <a:srgbClr val="F9423A">
+                  <a:shade val="67500"/>
+                  <a:satMod val="115000"/>
+                </a:srgbClr>
+              </a:gs>
+              <a:gs pos="100000">
+                <a:srgbClr val="F9423A">
+                  <a:shade val="100000"/>
+                  <a:satMod val="115000"/>
+                </a:srgbClr>
+              </a:gs>
+            </a:gsLst>
+            <a:lin ang="2700000" scaled="1"/>
+            <a:tileRect/>
+          </a:gradFill>
           <a:ln cap="flat">
             <a:noFill/>
             <a:prstDash val="solid"/>
@@ -6619,14 +6642,6 @@
               </a:rPr>
               <a:t>Application of Machine Learning Techniques for the Early Detection of Diabetes: A Comparative Study of Classification Models</a:t>
             </a:r>
-            <a:endParaRPr lang="en-US" sz="4800" b="1" spc="-1" dirty="0">
-              <a:solidFill>
-                <a:srgbClr val="FFFFFF"/>
-              </a:solidFill>
-              <a:latin typeface="Calibri"/>
-              <a:ea typeface="DejaVu Sans"/>
-              <a:cs typeface="DejaVu Sans"/>
-            </a:endParaRPr>
           </a:p>
           <a:p>
             <a:pPr marL="0" marR="0" lvl="0" indent="0" algn="ctr" defTabSz="914400" rtl="0" fontAlgn="auto" hangingPunct="1">
@@ -6648,21 +6663,17 @@
                 <a:uFillTx/>
               </a:defRPr>
             </a:pPr>
-            <a:r>
-              <a:rPr lang="en-US" sz="3600" b="1" i="0" u="none" strike="noStrike" kern="1200" cap="none" spc="-1" baseline="0" dirty="0">
-                <a:solidFill>
-                  <a:srgbClr val="FFFFFF"/>
-                </a:solidFill>
-                <a:uFillTx/>
-                <a:latin typeface="Calibri"/>
-                <a:ea typeface="DejaVu Sans"/>
-                <a:cs typeface="DejaVu Sans"/>
-              </a:rPr>
-              <a:t>Sebastian Russo </a:t>
-            </a:r>
-          </a:p>
-          <a:p>
-            <a:pPr marL="0" marR="0" lvl="0" indent="0" algn="ctr" defTabSz="914400" rtl="0" fontAlgn="auto" hangingPunct="1">
+            <a:endParaRPr lang="en-US" sz="4800" b="1" spc="-1" dirty="0">
+              <a:solidFill>
+                <a:srgbClr val="FFFFFF"/>
+              </a:solidFill>
+              <a:latin typeface="Calibri"/>
+              <a:ea typeface="DejaVu Sans"/>
+              <a:cs typeface="DejaVu Sans"/>
+            </a:endParaRPr>
+          </a:p>
+          <a:p>
+            <a:pPr marL="0" marR="0" lvl="0" indent="0" defTabSz="914400" rtl="0" fontAlgn="auto" hangingPunct="1">
               <a:lnSpc>
                 <a:spcPct val="90000"/>
               </a:lnSpc>
@@ -6682,7 +6693,7 @@
               </a:defRPr>
             </a:pPr>
             <a:r>
-              <a:rPr lang="en-US" sz="3600" b="1" spc="-1" dirty="0">
+              <a:rPr lang="en-US" sz="3600" u="sng" spc="-1" dirty="0">
                 <a:solidFill>
                   <a:srgbClr val="FFFFFF"/>
                 </a:solidFill>
@@ -6690,10 +6701,10 @@
                 <a:ea typeface="DejaVu Sans"/>
                 <a:cs typeface="DejaVu Sans"/>
               </a:rPr>
-              <a:t>Professor Rand </a:t>
+              <a:t>Student</a:t>
             </a:r>
             <a:r>
-              <a:rPr lang="en-US" sz="3600" b="1" spc="-1" dirty="0" err="1">
+              <a:rPr lang="en-US" sz="3600" spc="-1" dirty="0">
                 <a:solidFill>
                   <a:srgbClr val="FFFFFF"/>
                 </a:solidFill>
@@ -6701,19 +6712,23 @@
                 <a:ea typeface="DejaVu Sans"/>
                 <a:cs typeface="DejaVu Sans"/>
               </a:rPr>
-              <a:t>Kouatly</a:t>
+              <a:t>: </a:t>
             </a:r>
-            <a:endParaRPr lang="en-US" sz="3600" b="1" spc="-1" dirty="0">
-              <a:solidFill>
-                <a:srgbClr val="FFFFFF"/>
-              </a:solidFill>
-              <a:latin typeface="Calibri"/>
-              <a:ea typeface="DejaVu Sans"/>
-              <a:cs typeface="DejaVu Sans"/>
-            </a:endParaRPr>
-          </a:p>
-          <a:p>
-            <a:pPr marL="0" marR="0" lvl="0" indent="0" algn="ctr" defTabSz="914400" rtl="0" fontAlgn="auto" hangingPunct="1">
+            <a:r>
+              <a:rPr lang="en-US" sz="3600" i="0" u="none" strike="noStrike" kern="1200" cap="none" spc="-1" baseline="0" dirty="0">
+                <a:solidFill>
+                  <a:srgbClr val="FFFFFF"/>
+                </a:solidFill>
+                <a:uFillTx/>
+                <a:latin typeface="Calibri"/>
+                <a:ea typeface="DejaVu Sans"/>
+                <a:cs typeface="DejaVu Sans"/>
+              </a:rPr>
+              <a:t>Sebastian Russo </a:t>
+            </a:r>
+          </a:p>
+          <a:p>
+            <a:pPr marL="0" marR="0" lvl="0" indent="0" defTabSz="914400" rtl="0" fontAlgn="auto" hangingPunct="1">
               <a:lnSpc>
                 <a:spcPct val="90000"/>
               </a:lnSpc>
@@ -6733,7 +6748,7 @@
               </a:defRPr>
             </a:pPr>
             <a:r>
-              <a:rPr lang="en-US" sz="3600" b="1" spc="-1" dirty="0">
+              <a:rPr lang="en-US" sz="3600" u="sng" spc="-1" dirty="0">
                 <a:solidFill>
                   <a:srgbClr val="FFFFFF"/>
                 </a:solidFill>
@@ -6741,10 +6756,83 @@
                 <a:ea typeface="DejaVu Sans"/>
                 <a:cs typeface="DejaVu Sans"/>
               </a:rPr>
-              <a:t>Professor Souad El </a:t>
+              <a:t>Prof</a:t>
             </a:r>
             <a:r>
-              <a:rPr lang="en-US" sz="3600" b="1" spc="-1" dirty="0" err="1">
+              <a:rPr lang="en-US" sz="3600" spc="-1" dirty="0">
+                <a:solidFill>
+                  <a:srgbClr val="FFFFFF"/>
+                </a:solidFill>
+                <a:latin typeface="Calibri"/>
+                <a:ea typeface="DejaVu Sans"/>
+                <a:cs typeface="DejaVu Sans"/>
+              </a:rPr>
+              <a:t>: Rand </a:t>
+            </a:r>
+            <a:r>
+              <a:rPr lang="en-US" sz="3600" spc="-1" dirty="0" err="1">
+                <a:solidFill>
+                  <a:srgbClr val="FFFFFF"/>
+                </a:solidFill>
+                <a:latin typeface="Calibri"/>
+                <a:ea typeface="DejaVu Sans"/>
+                <a:cs typeface="DejaVu Sans"/>
+              </a:rPr>
+              <a:t>Kouatly</a:t>
+            </a:r>
+            <a:endParaRPr lang="en-US" sz="3600" spc="-1" dirty="0">
+              <a:solidFill>
+                <a:srgbClr val="FFFFFF"/>
+              </a:solidFill>
+              <a:latin typeface="Calibri"/>
+              <a:ea typeface="DejaVu Sans"/>
+              <a:cs typeface="DejaVu Sans"/>
+            </a:endParaRPr>
+          </a:p>
+          <a:p>
+            <a:pPr marL="0" marR="0" lvl="0" indent="0" defTabSz="914400" rtl="0" fontAlgn="auto" hangingPunct="1">
+              <a:lnSpc>
+                <a:spcPct val="90000"/>
+              </a:lnSpc>
+              <a:spcBef>
+                <a:spcPts val="0"/>
+              </a:spcBef>
+              <a:spcAft>
+                <a:spcPts val="0"/>
+              </a:spcAft>
+              <a:buNone/>
+              <a:tabLst/>
+              <a:defRPr sz="1800" b="0" i="0" u="none" strike="noStrike" kern="0" cap="none" spc="0" baseline="0">
+                <a:solidFill>
+                  <a:srgbClr val="000000"/>
+                </a:solidFill>
+                <a:uFillTx/>
+              </a:defRPr>
+            </a:pPr>
+            <a:r>
+              <a:rPr lang="en-US" sz="3600" u="sng" spc="-1" dirty="0">
+                <a:solidFill>
+                  <a:srgbClr val="FFFFFF"/>
+                </a:solidFill>
+                <a:latin typeface="Calibri"/>
+                <a:ea typeface="DejaVu Sans"/>
+                <a:cs typeface="DejaVu Sans"/>
+              </a:rPr>
+              <a:t>Prof</a:t>
+            </a:r>
+            <a:r>
+              <a:rPr lang="en-US" sz="3600" spc="-1" dirty="0">
+                <a:solidFill>
+                  <a:srgbClr val="FFFFFF"/>
+                </a:solidFill>
+                <a:latin typeface="Calibri"/>
+                <a:ea typeface="DejaVu Sans"/>
+                <a:cs typeface="DejaVu Sans"/>
+              </a:rPr>
+              <a:t>: Souad El </a:t>
+            </a:r>
+            <a:r>
+              <a:rPr lang="en-US" sz="3600" spc="-1" dirty="0" err="1">
                 <a:solidFill>
                   <a:srgbClr val="FFFFFF"/>
                 </a:solidFill>
@@ -6754,7 +6842,7 @@
               </a:rPr>
               <a:t>Hassanie</a:t>
             </a:r>
-            <a:endParaRPr lang="en-US" sz="3600" b="1" spc="-1" dirty="0">
+            <a:endParaRPr lang="en-US" sz="3600" spc="-1" dirty="0">
               <a:solidFill>
                 <a:srgbClr val="FFFFFF"/>
               </a:solidFill>
@@ -6845,7 +6933,7 @@
         </p:nvSpPr>
         <p:spPr>
           <a:xfrm>
-            <a:off x="9439195" y="5938918"/>
+            <a:off x="0" y="6199203"/>
             <a:ext cx="2562477" cy="658797"/>
           </a:xfrm>
           <a:prstGeom prst="rect">
@@ -7376,9 +7464,30 @@
           <a:prstGeom prst="rect">
             <a:avLst/>
           </a:prstGeom>
-          <a:solidFill>
-            <a:srgbClr val="F9423A"/>
-          </a:solidFill>
+          <a:gradFill flip="none" rotWithShape="1">
+            <a:gsLst>
+              <a:gs pos="0">
+                <a:srgbClr val="F9423A">
+                  <a:shade val="30000"/>
+                  <a:satMod val="115000"/>
+                </a:srgbClr>
+              </a:gs>
+              <a:gs pos="50000">
+                <a:srgbClr val="F9423A">
+                  <a:shade val="67500"/>
+                  <a:satMod val="115000"/>
+                </a:srgbClr>
+              </a:gs>
+              <a:gs pos="100000">
+                <a:srgbClr val="F9423A">
+                  <a:shade val="100000"/>
+                  <a:satMod val="115000"/>
+                </a:srgbClr>
+              </a:gs>
+            </a:gsLst>
+            <a:lin ang="5400000" scaled="1"/>
+            <a:tileRect/>
+          </a:gradFill>
           <a:ln cap="flat">
             <a:noFill/>
             <a:prstDash val="solid"/>
@@ -7519,6 +7628,37 @@
           </a:bodyPr>
           <a:lstStyle/>
           <a:p>
+            <a:pPr algn="ctr">
+              <a:lnSpc>
+                <a:spcPct val="90000"/>
+              </a:lnSpc>
+              <a:defRPr sz="1800" b="0" i="0" u="none" strike="noStrike" kern="0" cap="none" spc="0" baseline="0">
+                <a:solidFill>
+                  <a:srgbClr val="000000"/>
+                </a:solidFill>
+                <a:uFillTx/>
+              </a:defRPr>
+            </a:pPr>
+            <a:r>
+              <a:rPr lang="en-US" sz="4000" b="1" spc="-1" dirty="0">
+                <a:solidFill>
+                  <a:srgbClr val="FFFFFF"/>
+                </a:solidFill>
+                <a:ea typeface="DejaVu Sans"/>
+                <a:cs typeface="DejaVu Sans"/>
+              </a:rPr>
+              <a:t>Outline</a:t>
+            </a:r>
+            <a:endParaRPr lang="en-US" sz="4000" spc="-1" dirty="0">
+              <a:solidFill>
+                <a:srgbClr val="000000"/>
+              </a:solidFill>
+              <a:latin typeface="Arial"/>
+              <a:ea typeface="DejaVu Sans"/>
+              <a:cs typeface="DejaVu Sans"/>
+            </a:endParaRPr>
+          </a:p>
+          <a:p>
             <a:pPr marL="0" marR="0" lvl="0" indent="0" algn="ctr" defTabSz="914400" rtl="0" fontAlgn="auto" hangingPunct="1">
               <a:lnSpc>
                 <a:spcPct val="90000"/>
@@ -7541,18 +7681,18 @@
             <a:r>
               <a:rPr lang="en-US" sz="4000" b="1" i="0" u="none" strike="noStrike" kern="1200" cap="none" spc="-1" baseline="0" dirty="0">
                 <a:solidFill>
-                  <a:srgbClr val="FFFFFF"/>
+                  <a:srgbClr val="F9423A"/>
                 </a:solidFill>
                 <a:uFillTx/>
                 <a:latin typeface="Calibri"/>
                 <a:ea typeface="DejaVu Sans"/>
                 <a:cs typeface="DejaVu Sans"/>
               </a:rPr>
-              <a:t>Outline</a:t>
+              <a:t>line</a:t>
             </a:r>
             <a:endParaRPr lang="en-US" sz="4000" b="0" i="0" u="none" strike="noStrike" kern="1200" cap="none" spc="-1" baseline="0" dirty="0">
               <a:solidFill>
-                <a:srgbClr val="000000"/>
+                <a:srgbClr val="F9423A"/>
               </a:solidFill>
               <a:uFillTx/>
               <a:latin typeface="Arial"/>
@@ -7903,7 +8043,7 @@
                 <a:ea typeface="DejaVu Sans"/>
                 <a:cs typeface="DejaVu Sans"/>
               </a:rPr>
-              <a:t>Plan??????</a:t>
+              <a:t>Plan</a:t>
             </a:r>
           </a:p>
           <a:p>
@@ -13191,8 +13331,8 @@
         </p:nvSpPr>
         <p:spPr>
           <a:xfrm>
-            <a:off x="592202" y="1334877"/>
-            <a:ext cx="9835917" cy="4965841"/>
+            <a:off x="592202" y="892079"/>
+            <a:ext cx="9835917" cy="5608080"/>
           </a:xfrm>
           <a:prstGeom prst="rect">
             <a:avLst/>
@@ -13208,6 +13348,38 @@
             <a:noAutofit/>
           </a:bodyPr>
           <a:lstStyle/>
+          <a:p>
+            <a:pPr marL="342900" marR="0" lvl="0" indent="-342900" algn="l" defTabSz="914400" rtl="0" fontAlgn="auto" hangingPunct="1">
+              <a:lnSpc>
+                <a:spcPct val="90000"/>
+              </a:lnSpc>
+              <a:spcBef>
+                <a:spcPts val="1000"/>
+              </a:spcBef>
+              <a:spcAft>
+                <a:spcPts val="0"/>
+              </a:spcAft>
+              <a:buFont typeface="Arial" panose="020B0604020202020204" pitchFamily="34" charset="0"/>
+              <a:buChar char="•"/>
+              <a:tabLst/>
+              <a:defRPr sz="1800" b="0" i="0" u="none" strike="noStrike" kern="0" cap="none" spc="0" baseline="0">
+                <a:solidFill>
+                  <a:srgbClr val="000000"/>
+                </a:solidFill>
+                <a:uFillTx/>
+              </a:defRPr>
+            </a:pPr>
+            <a:r>
+              <a:rPr lang="en-US" sz="2400" b="1" spc="-1" dirty="0">
+                <a:solidFill>
+                  <a:srgbClr val="FF0000"/>
+                </a:solidFill>
+                <a:ea typeface="DejaVu Sans"/>
+                <a:cs typeface="DejaVu Sans"/>
+              </a:rPr>
+              <a:t>Thesis Proposal</a:t>
+            </a:r>
+          </a:p>
           <a:p>
             <a:pPr marL="342900" marR="0" lvl="0" indent="-342900" algn="l" defTabSz="914400" rtl="0" fontAlgn="auto" hangingPunct="1">
               <a:lnSpc>
@@ -13269,7 +13441,7 @@
                 <a:ea typeface="DejaVu Sans"/>
                 <a:cs typeface="DejaVu Sans"/>
               </a:rPr>
-              <a:t>Chapter 2 literature review</a:t>
+              <a:t>Chapter 2 Literature Review</a:t>
             </a:r>
           </a:p>
           <a:p>
@@ -13301,7 +13473,7 @@
                 <a:ea typeface="DejaVu Sans"/>
                 <a:cs typeface="DejaVu Sans"/>
               </a:rPr>
-              <a:t>Chapter 3 Theoretical background</a:t>
+              <a:t>Chapter 3 Theoretical Background</a:t>
             </a:r>
           </a:p>
           <a:p>
@@ -13525,25 +13697,8 @@
                 <a:ea typeface="DejaVu Sans"/>
                 <a:cs typeface="DejaVu Sans"/>
               </a:rPr>
-              <a:t>Chapter </a:t>
+              <a:t>Chapter 1 Introduction and Abstract</a:t>
             </a:r>
-            <a:r>
-              <a:rPr lang="en-US" sz="2400" b="1" spc="-1">
-                <a:solidFill>
-                  <a:srgbClr val="FF0000"/>
-                </a:solidFill>
-                <a:ea typeface="DejaVu Sans"/>
-                <a:cs typeface="DejaVu Sans"/>
-              </a:rPr>
-              <a:t>1 Introduction</a:t>
-            </a:r>
-            <a:endParaRPr lang="en-US" sz="2400" b="1" spc="-1" dirty="0">
-              <a:solidFill>
-                <a:srgbClr val="FF0000"/>
-              </a:solidFill>
-              <a:ea typeface="DejaVu Sans"/>
-              <a:cs typeface="DejaVu Sans"/>
-            </a:endParaRPr>
           </a:p>
           <a:p>
             <a:pPr marL="342900" marR="0" lvl="0" indent="-342900" algn="l" defTabSz="914400" rtl="0" fontAlgn="auto" hangingPunct="1">
@@ -13713,7 +13868,7 @@
                                         <p:tgtEl>
                                           <p:spTgt spid="3">
                                             <p:txEl>
-                                              <p:pRg st="0" end="0"/>
+                                              <p:pRg st="1" end="1"/>
                                             </p:txEl>
                                           </p:spTgt>
                                         </p:tgtEl>
@@ -13731,7 +13886,7 @@
                                         <p:tgtEl>
                                           <p:spTgt spid="3">
                                             <p:txEl>
-                                              <p:pRg st="0" end="0"/>
+                                              <p:pRg st="1" end="1"/>
                                             </p:txEl>
                                           </p:spTgt>
                                         </p:tgtEl>
@@ -13758,7 +13913,7 @@
                                         <p:tgtEl>
                                           <p:spTgt spid="3">
                                             <p:txEl>
-                                              <p:pRg st="0" end="0"/>
+                                              <p:pRg st="1" end="1"/>
                                             </p:txEl>
                                           </p:spTgt>
                                         </p:tgtEl>
@@ -13816,7 +13971,7 @@
                                         <p:tgtEl>
                                           <p:spTgt spid="3">
                                             <p:txEl>
-                                              <p:pRg st="1" end="1"/>
+                                              <p:pRg st="0" end="0"/>
                                             </p:txEl>
                                           </p:spTgt>
                                         </p:tgtEl>
@@ -13834,7 +13989,7 @@
                                         <p:tgtEl>
                                           <p:spTgt spid="3">
                                             <p:txEl>
-                                              <p:pRg st="1" end="1"/>
+                                              <p:pRg st="0" end="0"/>
                                             </p:txEl>
                                           </p:spTgt>
                                         </p:tgtEl>
@@ -13861,7 +14016,7 @@
                                         <p:tgtEl>
                                           <p:spTgt spid="3">
                                             <p:txEl>
-                                              <p:pRg st="1" end="1"/>
+                                              <p:pRg st="0" end="0"/>
                                             </p:txEl>
                                           </p:spTgt>
                                         </p:tgtEl>
@@ -14686,6 +14841,109 @@
                                           <p:spTgt spid="3">
                                             <p:txEl>
                                               <p:pRg st="9" end="9"/>
+                                            </p:txEl>
+                                          </p:spTgt>
+                                        </p:tgtEl>
+                                        <p:attrNameLst>
+                                          <p:attrName>ppt_y</p:attrName>
+                                        </p:attrNameLst>
+                                      </p:cBhvr>
+                                      <p:tavLst>
+                                        <p:tav tm="0">
+                                          <p:val>
+                                            <p:strVal val="1+#ppt_h/2"/>
+                                          </p:val>
+                                        </p:tav>
+                                        <p:tav tm="100000">
+                                          <p:val>
+                                            <p:strVal val="#ppt_y"/>
+                                          </p:val>
+                                        </p:tav>
+                                      </p:tavLst>
+                                    </p:anim>
+                                  </p:childTnLst>
+                                </p:cTn>
+                              </p:par>
+                            </p:childTnLst>
+                          </p:cTn>
+                        </p:par>
+                      </p:childTnLst>
+                    </p:cTn>
+                  </p:par>
+                  <p:par>
+                    <p:cTn id="69" fill="hold">
+                      <p:stCondLst>
+                        <p:cond delay="indefinite"/>
+                      </p:stCondLst>
+                      <p:childTnLst>
+                        <p:par>
+                          <p:cTn id="70" fill="hold">
+                            <p:stCondLst>
+                              <p:cond delay="0"/>
+                            </p:stCondLst>
+                            <p:childTnLst>
+                              <p:par>
+                                <p:cTn id="71" presetID="2" presetClass="entr" presetSubtype="4" fill="hold" nodeType="clickEffect">
+                                  <p:stCondLst>
+                                    <p:cond delay="0"/>
+                                  </p:stCondLst>
+                                  <p:childTnLst>
+                                    <p:set>
+                                      <p:cBhvr>
+                                        <p:cTn id="72" dur="1" fill="hold">
+                                          <p:stCondLst>
+                                            <p:cond delay="0"/>
+                                          </p:stCondLst>
+                                        </p:cTn>
+                                        <p:tgtEl>
+                                          <p:spTgt spid="3">
+                                            <p:txEl>
+                                              <p:pRg st="10" end="10"/>
+                                            </p:txEl>
+                                          </p:spTgt>
+                                        </p:tgtEl>
+                                        <p:attrNameLst>
+                                          <p:attrName>style.visibility</p:attrName>
+                                        </p:attrNameLst>
+                                      </p:cBhvr>
+                                      <p:to>
+                                        <p:strVal val="visible"/>
+                                      </p:to>
+                                    </p:set>
+                                    <p:anim calcmode="lin" valueType="num">
+                                      <p:cBhvr>
+                                        <p:cTn id="73" dur="500" fill="hold"/>
+                                        <p:tgtEl>
+                                          <p:spTgt spid="3">
+                                            <p:txEl>
+                                              <p:pRg st="10" end="10"/>
+                                            </p:txEl>
+                                          </p:spTgt>
+                                        </p:tgtEl>
+                                        <p:attrNameLst>
+                                          <p:attrName>ppt_x</p:attrName>
+                                        </p:attrNameLst>
+                                      </p:cBhvr>
+                                      <p:tavLst>
+                                        <p:tav tm="0">
+                                          <p:val>
+                                            <p:strVal val="#ppt_x"/>
+                                          </p:val>
+                                        </p:tav>
+                                        <p:tav tm="100000">
+                                          <p:val>
+                                            <p:strVal val="#ppt_x"/>
+                                          </p:val>
+                                        </p:tav>
+                                      </p:tavLst>
+                                    </p:anim>
+                                    <p:anim calcmode="lin" valueType="num">
+                                      <p:cBhvr>
+                                        <p:cTn id="74" dur="500" fill="hold"/>
+                                        <p:tgtEl>
+                                          <p:spTgt spid="3">
+                                            <p:txEl>
+                                              <p:pRg st="10" end="10"/>
                                             </p:txEl>
                                           </p:spTgt>
                                         </p:tgtEl>
@@ -16046,18 +16304,18 @@
 </file>
 
 <file path=customXml/item1.xml><?xml version="1.0" encoding="utf-8"?>
+<p:properties xmlns:p="http://schemas.microsoft.com/office/2006/metadata/properties" xmlns:xsi="http://www.w3.org/2001/XMLSchema-instance" xmlns:pc="http://schemas.microsoft.com/office/infopath/2007/PartnerControls">
+  <documentManagement/>
+</p:properties>
+</file>
+
+<file path=customXml/item2.xml><?xml version="1.0" encoding="utf-8"?>
 <?mso-contentType ?>
 <FormTemplates xmlns="http://schemas.microsoft.com/sharepoint/v3/contenttype/forms">
   <Display>DocumentLibraryForm</Display>
   <Edit>DocumentLibraryForm</Edit>
   <New>DocumentLibraryForm</New>
 </FormTemplates>
-</file>
-
-<file path=customXml/item2.xml><?xml version="1.0" encoding="utf-8"?>
-<p:properties xmlns:p="http://schemas.microsoft.com/office/2006/metadata/properties" xmlns:xsi="http://www.w3.org/2001/XMLSchema-instance" xmlns:pc="http://schemas.microsoft.com/office/infopath/2007/PartnerControls">
-  <documentManagement/>
-</p:properties>
 </file>
 
 <file path=customXml/item3.xml><?xml version="1.0" encoding="utf-8"?>
@@ -16223,18 +16481,18 @@
 </file>
 
 <file path=customXml/itemProps1.xml><?xml version="1.0" encoding="utf-8"?>
-<ds:datastoreItem xmlns:ds="http://schemas.openxmlformats.org/officeDocument/2006/customXml" ds:itemID="{01A1B104-95A3-45CE-9D88-A67A9C7EEAB6}">
+<ds:datastoreItem xmlns:ds="http://schemas.openxmlformats.org/officeDocument/2006/customXml" ds:itemID="{046E539C-0D7D-44CC-9814-6A6D13BD35F8}">
   <ds:schemaRefs>
-    <ds:schemaRef ds:uri="http://schemas.microsoft.com/sharepoint/v3/contenttype/forms"/>
+    <ds:schemaRef ds:uri="http://schemas.microsoft.com/office/2006/metadata/properties"/>
+    <ds:schemaRef ds:uri="http://schemas.microsoft.com/office/infopath/2007/PartnerControls"/>
   </ds:schemaRefs>
 </ds:datastoreItem>
 </file>
 
 <file path=customXml/itemProps2.xml><?xml version="1.0" encoding="utf-8"?>
-<ds:datastoreItem xmlns:ds="http://schemas.openxmlformats.org/officeDocument/2006/customXml" ds:itemID="{046E539C-0D7D-44CC-9814-6A6D13BD35F8}">
+<ds:datastoreItem xmlns:ds="http://schemas.openxmlformats.org/officeDocument/2006/customXml" ds:itemID="{01A1B104-95A3-45CE-9D88-A67A9C7EEAB6}">
   <ds:schemaRefs>
-    <ds:schemaRef ds:uri="http://schemas.microsoft.com/office/2006/metadata/properties"/>
-    <ds:schemaRef ds:uri="http://schemas.microsoft.com/office/infopath/2007/PartnerControls"/>
+    <ds:schemaRef ds:uri="http://schemas.microsoft.com/sharepoint/v3/contenttype/forms"/>
   </ds:schemaRefs>
 </ds:datastoreItem>
 </file>

</xml_diff>